<commit_message>
Changes in LocalT2 and powerpoint
</commit_message>
<xml_diff>
--- a/Thresholding/Thresholding.pptx
+++ b/Thresholding/Thresholding.pptx
@@ -5,7 +5,7 @@
     <p:sldMasterId id="2147483648" r:id="rId1"/>
   </p:sldMasterIdLst>
   <p:notesMasterIdLst>
-    <p:notesMasterId r:id="rId10"/>
+    <p:notesMasterId r:id="rId13"/>
   </p:notesMasterIdLst>
   <p:sldIdLst>
     <p:sldId id="256" r:id="rId2"/>
@@ -16,6 +16,9 @@
     <p:sldId id="261" r:id="rId7"/>
     <p:sldId id="262" r:id="rId8"/>
     <p:sldId id="263" r:id="rId9"/>
+    <p:sldId id="264" r:id="rId10"/>
+    <p:sldId id="265" r:id="rId11"/>
+    <p:sldId id="266" r:id="rId12"/>
   </p:sldIdLst>
   <p:sldSz cx="12192000" cy="6858000"/>
   <p:notesSz cx="6858000" cy="9144000"/>
@@ -114,13 +117,18 @@
       </a:defRPr>
     </a:lvl9pPr>
   </p:defaultTextStyle>
+  <p:extLst>
+    <p:ext uri="{EFAFB233-063F-42B5-8137-9DF3F51BA10A}">
+      <p15:sldGuideLst xmlns:p15="http://schemas.microsoft.com/office/powerpoint/2012/main"/>
+    </p:ext>
+  </p:extLst>
 </p:presentation>
 </file>
 
 <file path=ppt/revisionInfo.xml><?xml version="1.0" encoding="utf-8"?>
 <p1510:revInfo xmlns:a="http://schemas.openxmlformats.org/drawingml/2006/main" xmlns:r="http://schemas.openxmlformats.org/officeDocument/2006/relationships" xmlns:p1510="http://schemas.microsoft.com/office/powerpoint/2015/10/main">
   <p1510:revLst>
-    <p1510:client id="{180266BD-9C8F-4BC4-AEA3-CCB7C1E90ED0}" v="31" dt="2024-01-29T18:22:22.015"/>
+    <p1510:client id="{180266BD-9C8F-4BC4-AEA3-CCB7C1E90ED0}" v="45" dt="2024-01-31T12:05:09.131"/>
   </p1510:revLst>
 </p1510:revInfo>
 </file>
@@ -130,7 +138,7 @@
   <pc:docChgLst>
     <pc:chgData name="Pablo Tejero Sanz" userId="9498043962a09e1f" providerId="LiveId" clId="{180266BD-9C8F-4BC4-AEA3-CCB7C1E90ED0}"/>
     <pc:docChg chg="custSel addSld modSld">
-      <pc:chgData name="Pablo Tejero Sanz" userId="9498043962a09e1f" providerId="LiveId" clId="{180266BD-9C8F-4BC4-AEA3-CCB7C1E90ED0}" dt="2024-01-29T18:22:55.273" v="1218" actId="1076"/>
+      <pc:chgData name="Pablo Tejero Sanz" userId="9498043962a09e1f" providerId="LiveId" clId="{180266BD-9C8F-4BC4-AEA3-CCB7C1E90ED0}" dt="2024-01-31T12:05:18.197" v="1945" actId="1076"/>
       <pc:docMkLst>
         <pc:docMk/>
       </pc:docMkLst>
@@ -407,12 +415,153 @@
           </ac:spMkLst>
         </pc:spChg>
       </pc:sldChg>
-      <pc:sldChg chg="new">
-        <pc:chgData name="Pablo Tejero Sanz" userId="9498043962a09e1f" providerId="LiveId" clId="{180266BD-9C8F-4BC4-AEA3-CCB7C1E90ED0}" dt="2024-01-29T18:03:45.553" v="805" actId="680"/>
+      <pc:sldChg chg="addSp modSp new mod">
+        <pc:chgData name="Pablo Tejero Sanz" userId="9498043962a09e1f" providerId="LiveId" clId="{180266BD-9C8F-4BC4-AEA3-CCB7C1E90ED0}" dt="2024-01-31T11:06:49.112" v="1550" actId="6549"/>
         <pc:sldMkLst>
           <pc:docMk/>
           <pc:sldMk cId="3483868800" sldId="263"/>
         </pc:sldMkLst>
+        <pc:spChg chg="add mod">
+          <ac:chgData name="Pablo Tejero Sanz" userId="9498043962a09e1f" providerId="LiveId" clId="{180266BD-9C8F-4BC4-AEA3-CCB7C1E90ED0}" dt="2024-01-31T11:06:49.112" v="1550" actId="6549"/>
+          <ac:spMkLst>
+            <pc:docMk/>
+            <pc:sldMk cId="3483868800" sldId="263"/>
+            <ac:spMk id="2" creationId="{E52CC449-3681-A58A-0AF6-397563EC3662}"/>
+          </ac:spMkLst>
+        </pc:spChg>
+        <pc:spChg chg="add mod">
+          <ac:chgData name="Pablo Tejero Sanz" userId="9498043962a09e1f" providerId="LiveId" clId="{180266BD-9C8F-4BC4-AEA3-CCB7C1E90ED0}" dt="2024-01-31T10:57:38.995" v="1268" actId="14100"/>
+          <ac:spMkLst>
+            <pc:docMk/>
+            <pc:sldMk cId="3483868800" sldId="263"/>
+            <ac:spMk id="3" creationId="{FD852611-B55E-A45C-5B7A-D314213F5EEB}"/>
+          </ac:spMkLst>
+        </pc:spChg>
+        <pc:spChg chg="add mod">
+          <ac:chgData name="Pablo Tejero Sanz" userId="9498043962a09e1f" providerId="LiveId" clId="{180266BD-9C8F-4BC4-AEA3-CCB7C1E90ED0}" dt="2024-01-31T10:58:07.793" v="1332" actId="14100"/>
+          <ac:spMkLst>
+            <pc:docMk/>
+            <pc:sldMk cId="3483868800" sldId="263"/>
+            <ac:spMk id="4" creationId="{0B496ECD-CFE5-DB5D-95EB-9D599B89462E}"/>
+          </ac:spMkLst>
+        </pc:spChg>
+        <pc:spChg chg="add mod">
+          <ac:chgData name="Pablo Tejero Sanz" userId="9498043962a09e1f" providerId="LiveId" clId="{180266BD-9C8F-4BC4-AEA3-CCB7C1E90ED0}" dt="2024-01-31T10:59:48.214" v="1436" actId="1076"/>
+          <ac:spMkLst>
+            <pc:docMk/>
+            <pc:sldMk cId="3483868800" sldId="263"/>
+            <ac:spMk id="5" creationId="{A84FBC1D-C7BB-DB40-1500-C04E8CB76497}"/>
+          </ac:spMkLst>
+        </pc:spChg>
+        <pc:spChg chg="add mod">
+          <ac:chgData name="Pablo Tejero Sanz" userId="9498043962a09e1f" providerId="LiveId" clId="{180266BD-9C8F-4BC4-AEA3-CCB7C1E90ED0}" dt="2024-01-31T11:05:36.839" v="1488" actId="14100"/>
+          <ac:spMkLst>
+            <pc:docMk/>
+            <pc:sldMk cId="3483868800" sldId="263"/>
+            <ac:spMk id="6" creationId="{62C3D8CA-5A08-40CD-AC8C-C00715C80D50}"/>
+          </ac:spMkLst>
+        </pc:spChg>
+        <pc:spChg chg="add mod">
+          <ac:chgData name="Pablo Tejero Sanz" userId="9498043962a09e1f" providerId="LiveId" clId="{180266BD-9C8F-4BC4-AEA3-CCB7C1E90ED0}" dt="2024-01-31T11:06:15.102" v="1527" actId="20577"/>
+          <ac:spMkLst>
+            <pc:docMk/>
+            <pc:sldMk cId="3483868800" sldId="263"/>
+            <ac:spMk id="7" creationId="{F2978384-F83E-6E4F-082A-A8AF662CEE3F}"/>
+          </ac:spMkLst>
+        </pc:spChg>
+      </pc:sldChg>
+      <pc:sldChg chg="addSp modSp new mod">
+        <pc:chgData name="Pablo Tejero Sanz" userId="9498043962a09e1f" providerId="LiveId" clId="{180266BD-9C8F-4BC4-AEA3-CCB7C1E90ED0}" dt="2024-01-31T11:38:40.631" v="1763" actId="1076"/>
+        <pc:sldMkLst>
+          <pc:docMk/>
+          <pc:sldMk cId="1215737357" sldId="264"/>
+        </pc:sldMkLst>
+        <pc:spChg chg="add mod">
+          <ac:chgData name="Pablo Tejero Sanz" userId="9498043962a09e1f" providerId="LiveId" clId="{180266BD-9C8F-4BC4-AEA3-CCB7C1E90ED0}" dt="2024-01-31T11:07:04.532" v="1562" actId="1076"/>
+          <ac:spMkLst>
+            <pc:docMk/>
+            <pc:sldMk cId="1215737357" sldId="264"/>
+            <ac:spMk id="2" creationId="{BF7F1E8E-626D-5A6C-A874-6BE52166F9B7}"/>
+          </ac:spMkLst>
+        </pc:spChg>
+        <pc:spChg chg="add mod">
+          <ac:chgData name="Pablo Tejero Sanz" userId="9498043962a09e1f" providerId="LiveId" clId="{180266BD-9C8F-4BC4-AEA3-CCB7C1E90ED0}" dt="2024-01-31T11:19:25.457" v="1589" actId="115"/>
+          <ac:spMkLst>
+            <pc:docMk/>
+            <pc:sldMk cId="1215737357" sldId="264"/>
+            <ac:spMk id="3" creationId="{1C4F3A09-5359-D1F8-7CE4-1C5803EE33D9}"/>
+          </ac:spMkLst>
+        </pc:spChg>
+        <pc:spChg chg="add mod">
+          <ac:chgData name="Pablo Tejero Sanz" userId="9498043962a09e1f" providerId="LiveId" clId="{180266BD-9C8F-4BC4-AEA3-CCB7C1E90ED0}" dt="2024-01-31T11:19:19.757" v="1587" actId="1076"/>
+          <ac:spMkLst>
+            <pc:docMk/>
+            <pc:sldMk cId="1215737357" sldId="264"/>
+            <ac:spMk id="4" creationId="{17CC86A6-B5C0-E541-7760-09755E84B127}"/>
+          </ac:spMkLst>
+        </pc:spChg>
+        <pc:spChg chg="add mod">
+          <ac:chgData name="Pablo Tejero Sanz" userId="9498043962a09e1f" providerId="LiveId" clId="{180266BD-9C8F-4BC4-AEA3-CCB7C1E90ED0}" dt="2024-01-31T11:38:40.631" v="1763" actId="1076"/>
+          <ac:spMkLst>
+            <pc:docMk/>
+            <pc:sldMk cId="1215737357" sldId="264"/>
+            <ac:spMk id="5" creationId="{D6CE7CEB-B694-2F79-E157-7664C60C7DC1}"/>
+          </ac:spMkLst>
+        </pc:spChg>
+        <pc:spChg chg="add mod">
+          <ac:chgData name="Pablo Tejero Sanz" userId="9498043962a09e1f" providerId="LiveId" clId="{180266BD-9C8F-4BC4-AEA3-CCB7C1E90ED0}" dt="2024-01-31T11:35:45.655" v="1762" actId="20577"/>
+          <ac:spMkLst>
+            <pc:docMk/>
+            <pc:sldMk cId="1215737357" sldId="264"/>
+            <ac:spMk id="6" creationId="{2BEFC1EE-0C7A-1A81-C43F-7C3C99332E24}"/>
+          </ac:spMkLst>
+        </pc:spChg>
+      </pc:sldChg>
+      <pc:sldChg chg="addSp modSp new mod modNotesTx">
+        <pc:chgData name="Pablo Tejero Sanz" userId="9498043962a09e1f" providerId="LiveId" clId="{180266BD-9C8F-4BC4-AEA3-CCB7C1E90ED0}" dt="2024-01-31T11:46:03.907" v="1932" actId="20577"/>
+        <pc:sldMkLst>
+          <pc:docMk/>
+          <pc:sldMk cId="2498770784" sldId="265"/>
+        </pc:sldMkLst>
+        <pc:spChg chg="add mod">
+          <ac:chgData name="Pablo Tejero Sanz" userId="9498043962a09e1f" providerId="LiveId" clId="{180266BD-9C8F-4BC4-AEA3-CCB7C1E90ED0}" dt="2024-01-31T11:39:13.143" v="1777" actId="1076"/>
+          <ac:spMkLst>
+            <pc:docMk/>
+            <pc:sldMk cId="2498770784" sldId="265"/>
+            <ac:spMk id="2" creationId="{2EE9AE6D-C3C9-B79C-823E-D72075B790B1}"/>
+          </ac:spMkLst>
+        </pc:spChg>
+        <pc:spChg chg="add mod">
+          <ac:chgData name="Pablo Tejero Sanz" userId="9498043962a09e1f" providerId="LiveId" clId="{180266BD-9C8F-4BC4-AEA3-CCB7C1E90ED0}" dt="2024-01-31T11:39:42.358" v="1795" actId="20577"/>
+          <ac:spMkLst>
+            <pc:docMk/>
+            <pc:sldMk cId="2498770784" sldId="265"/>
+            <ac:spMk id="3" creationId="{2FBE8B20-51C0-8E26-FC21-C2F4C58FB329}"/>
+          </ac:spMkLst>
+        </pc:spChg>
+        <pc:picChg chg="add mod">
+          <ac:chgData name="Pablo Tejero Sanz" userId="9498043962a09e1f" providerId="LiveId" clId="{180266BD-9C8F-4BC4-AEA3-CCB7C1E90ED0}" dt="2024-01-31T11:39:55.822" v="1797" actId="1076"/>
+          <ac:picMkLst>
+            <pc:docMk/>
+            <pc:sldMk cId="2498770784" sldId="265"/>
+            <ac:picMk id="5" creationId="{7DEA88F9-64C0-D0CC-1C92-D12C801C7B0C}"/>
+          </ac:picMkLst>
+        </pc:picChg>
+      </pc:sldChg>
+      <pc:sldChg chg="addSp modSp new mod">
+        <pc:chgData name="Pablo Tejero Sanz" userId="9498043962a09e1f" providerId="LiveId" clId="{180266BD-9C8F-4BC4-AEA3-CCB7C1E90ED0}" dt="2024-01-31T12:05:18.197" v="1945" actId="1076"/>
+        <pc:sldMkLst>
+          <pc:docMk/>
+          <pc:sldMk cId="2537575845" sldId="266"/>
+        </pc:sldMkLst>
+        <pc:spChg chg="add mod">
+          <ac:chgData name="Pablo Tejero Sanz" userId="9498043962a09e1f" providerId="LiveId" clId="{180266BD-9C8F-4BC4-AEA3-CCB7C1E90ED0}" dt="2024-01-31T12:05:18.197" v="1945" actId="1076"/>
+          <ac:spMkLst>
+            <pc:docMk/>
+            <pc:sldMk cId="2537575845" sldId="266"/>
+            <ac:spMk id="2" creationId="{2DBBD0B3-3302-D276-E085-307880CCF2B7}"/>
+          </ac:spMkLst>
+        </pc:spChg>
       </pc:sldChg>
     </pc:docChg>
   </pc:docChgLst>
@@ -501,7 +650,7 @@
           <a:p>
             <a:fld id="{8A02DA10-492C-4E7F-8FEF-21524E44A6F9}" type="datetimeFigureOut">
               <a:rPr lang="es-ES" smtClean="0"/>
-              <a:t>29/01/2024</a:t>
+              <a:t>31/01/2024</a:t>
             </a:fld>
             <a:endParaRPr lang="es-ES"/>
           </a:p>
@@ -769,6 +918,161 @@
 </p:notesMaster>
 </file>
 
+<file path=ppt/notesSlides/notesSlide1.xml><?xml version="1.0" encoding="utf-8"?>
+<p:notes xmlns:a="http://schemas.openxmlformats.org/drawingml/2006/main" xmlns:r="http://schemas.openxmlformats.org/officeDocument/2006/relationships" xmlns:p="http://schemas.openxmlformats.org/presentationml/2006/main">
+  <p:cSld>
+    <p:spTree>
+      <p:nvGrpSpPr>
+        <p:cNvPr id="1" name=""/>
+        <p:cNvGrpSpPr/>
+        <p:nvPr/>
+      </p:nvGrpSpPr>
+      <p:grpSpPr>
+        <a:xfrm>
+          <a:off x="0" y="0"/>
+          <a:ext cx="0" cy="0"/>
+          <a:chOff x="0" y="0"/>
+          <a:chExt cx="0" cy="0"/>
+        </a:xfrm>
+      </p:grpSpPr>
+      <p:sp>
+        <p:nvSpPr>
+          <p:cNvPr id="2" name="Slide Image Placeholder 1"/>
+          <p:cNvSpPr>
+            <a:spLocks noGrp="1" noRot="1" noChangeAspect="1"/>
+          </p:cNvSpPr>
+          <p:nvPr>
+            <p:ph type="sldImg"/>
+          </p:nvPr>
+        </p:nvSpPr>
+        <p:spPr/>
+      </p:sp>
+      <p:sp>
+        <p:nvSpPr>
+          <p:cNvPr id="3" name="Notes Placeholder 2"/>
+          <p:cNvSpPr>
+            <a:spLocks noGrp="1"/>
+          </p:cNvSpPr>
+          <p:nvPr>
+            <p:ph type="body" idx="1"/>
+          </p:nvPr>
+        </p:nvSpPr>
+        <p:spPr/>
+        <p:txBody>
+          <a:bodyPr/>
+          <a:lstStyle/>
+          <a:p>
+            <a:r>
+              <a:rPr lang="es-ES" dirty="0"/>
+              <a:t>GE = mean expresión </a:t>
+            </a:r>
+            <a:r>
+              <a:rPr lang="es-ES" dirty="0" err="1"/>
+              <a:t>of</a:t>
+            </a:r>
+            <a:r>
+              <a:rPr lang="es-ES" dirty="0"/>
+              <a:t> the </a:t>
+            </a:r>
+            <a:r>
+              <a:rPr lang="es-ES" dirty="0" err="1"/>
+              <a:t>ith</a:t>
+            </a:r>
+            <a:r>
+              <a:rPr lang="es-ES" dirty="0"/>
+              <a:t> gene </a:t>
+            </a:r>
+            <a:r>
+              <a:rPr lang="es-ES" dirty="0" err="1"/>
+              <a:t>across</a:t>
+            </a:r>
+            <a:r>
+              <a:rPr lang="es-ES" dirty="0"/>
+              <a:t> </a:t>
+            </a:r>
+            <a:r>
+              <a:rPr lang="es-ES" dirty="0" err="1"/>
+              <a:t>contexts</a:t>
+            </a:r>
+            <a:r>
+              <a:rPr lang="es-ES" dirty="0"/>
+              <a:t>.</a:t>
+            </a:r>
+          </a:p>
+          <a:p>
+            <a:r>
+              <a:rPr lang="es-ES" dirty="0" err="1"/>
+              <a:t>Multiply</a:t>
+            </a:r>
+            <a:r>
+              <a:rPr lang="es-ES" dirty="0"/>
+              <a:t> GC </a:t>
+            </a:r>
+            <a:r>
+              <a:rPr lang="es-ES" dirty="0" err="1"/>
+              <a:t>by</a:t>
+            </a:r>
+            <a:r>
+              <a:rPr lang="es-ES" dirty="0"/>
+              <a:t> 100.</a:t>
+            </a:r>
+          </a:p>
+          <a:p>
+            <a:r>
+              <a:rPr lang="es-ES" dirty="0" err="1"/>
+              <a:t>Localgini</a:t>
+            </a:r>
+            <a:r>
+              <a:rPr lang="es-ES" dirty="0"/>
+              <a:t> </a:t>
+            </a:r>
+            <a:r>
+              <a:rPr lang="es-ES" dirty="0" err="1"/>
+              <a:t>threshold</a:t>
+            </a:r>
+            <a:r>
+              <a:rPr lang="es-ES" dirty="0"/>
+              <a:t>: </a:t>
+            </a:r>
+          </a:p>
+        </p:txBody>
+      </p:sp>
+      <p:sp>
+        <p:nvSpPr>
+          <p:cNvPr id="4" name="Slide Number Placeholder 3"/>
+          <p:cNvSpPr>
+            <a:spLocks noGrp="1"/>
+          </p:cNvSpPr>
+          <p:nvPr>
+            <p:ph type="sldNum" sz="quarter" idx="5"/>
+          </p:nvPr>
+        </p:nvSpPr>
+        <p:spPr/>
+        <p:txBody>
+          <a:bodyPr/>
+          <a:lstStyle/>
+          <a:p>
+            <a:fld id="{E9958CF7-B764-4790-8D44-A19D621DD650}" type="slidenum">
+              <a:rPr lang="es-ES" smtClean="0"/>
+              <a:t>10</a:t>
+            </a:fld>
+            <a:endParaRPr lang="es-ES"/>
+          </a:p>
+        </p:txBody>
+      </p:sp>
+    </p:spTree>
+    <p:extLst>
+      <p:ext uri="{BB962C8B-B14F-4D97-AF65-F5344CB8AC3E}">
+        <p14:creationId xmlns:p14="http://schemas.microsoft.com/office/powerpoint/2010/main" val="1634419385"/>
+      </p:ext>
+    </p:extLst>
+  </p:cSld>
+  <p:clrMapOvr>
+    <a:masterClrMapping/>
+  </p:clrMapOvr>
+</p:notes>
+</file>
+
 <file path=ppt/slideLayouts/slideLayout1.xml><?xml version="1.0" encoding="utf-8"?>
 <p:sldLayout xmlns:a="http://schemas.openxmlformats.org/drawingml/2006/main" xmlns:r="http://schemas.openxmlformats.org/officeDocument/2006/relationships" xmlns:p="http://schemas.openxmlformats.org/presentationml/2006/main" type="title" preserve="1">
   <p:cSld name="Title Slide">
@@ -918,7 +1222,7 @@
           <a:p>
             <a:fld id="{3B30799D-08C4-469E-966B-49D3B77473EF}" type="datetimeFigureOut">
               <a:rPr lang="es-ES" smtClean="0"/>
-              <a:t>29/01/2024</a:t>
+              <a:t>31/01/2024</a:t>
             </a:fld>
             <a:endParaRPr lang="es-ES"/>
           </a:p>
@@ -1118,7 +1422,7 @@
           <a:p>
             <a:fld id="{3B30799D-08C4-469E-966B-49D3B77473EF}" type="datetimeFigureOut">
               <a:rPr lang="es-ES" smtClean="0"/>
-              <a:t>29/01/2024</a:t>
+              <a:t>31/01/2024</a:t>
             </a:fld>
             <a:endParaRPr lang="es-ES"/>
           </a:p>
@@ -1328,7 +1632,7 @@
           <a:p>
             <a:fld id="{3B30799D-08C4-469E-966B-49D3B77473EF}" type="datetimeFigureOut">
               <a:rPr lang="es-ES" smtClean="0"/>
-              <a:t>29/01/2024</a:t>
+              <a:t>31/01/2024</a:t>
             </a:fld>
             <a:endParaRPr lang="es-ES"/>
           </a:p>
@@ -1528,7 +1832,7 @@
           <a:p>
             <a:fld id="{3B30799D-08C4-469E-966B-49D3B77473EF}" type="datetimeFigureOut">
               <a:rPr lang="es-ES" smtClean="0"/>
-              <a:t>29/01/2024</a:t>
+              <a:t>31/01/2024</a:t>
             </a:fld>
             <a:endParaRPr lang="es-ES"/>
           </a:p>
@@ -1804,7 +2108,7 @@
           <a:p>
             <a:fld id="{3B30799D-08C4-469E-966B-49D3B77473EF}" type="datetimeFigureOut">
               <a:rPr lang="es-ES" smtClean="0"/>
-              <a:t>29/01/2024</a:t>
+              <a:t>31/01/2024</a:t>
             </a:fld>
             <a:endParaRPr lang="es-ES"/>
           </a:p>
@@ -2072,7 +2376,7 @@
           <a:p>
             <a:fld id="{3B30799D-08C4-469E-966B-49D3B77473EF}" type="datetimeFigureOut">
               <a:rPr lang="es-ES" smtClean="0"/>
-              <a:t>29/01/2024</a:t>
+              <a:t>31/01/2024</a:t>
             </a:fld>
             <a:endParaRPr lang="es-ES"/>
           </a:p>
@@ -2487,7 +2791,7 @@
           <a:p>
             <a:fld id="{3B30799D-08C4-469E-966B-49D3B77473EF}" type="datetimeFigureOut">
               <a:rPr lang="es-ES" smtClean="0"/>
-              <a:t>29/01/2024</a:t>
+              <a:t>31/01/2024</a:t>
             </a:fld>
             <a:endParaRPr lang="es-ES"/>
           </a:p>
@@ -2629,7 +2933,7 @@
           <a:p>
             <a:fld id="{3B30799D-08C4-469E-966B-49D3B77473EF}" type="datetimeFigureOut">
               <a:rPr lang="es-ES" smtClean="0"/>
-              <a:t>29/01/2024</a:t>
+              <a:t>31/01/2024</a:t>
             </a:fld>
             <a:endParaRPr lang="es-ES"/>
           </a:p>
@@ -2742,7 +3046,7 @@
           <a:p>
             <a:fld id="{3B30799D-08C4-469E-966B-49D3B77473EF}" type="datetimeFigureOut">
               <a:rPr lang="es-ES" smtClean="0"/>
-              <a:t>29/01/2024</a:t>
+              <a:t>31/01/2024</a:t>
             </a:fld>
             <a:endParaRPr lang="es-ES"/>
           </a:p>
@@ -3055,7 +3359,7 @@
           <a:p>
             <a:fld id="{3B30799D-08C4-469E-966B-49D3B77473EF}" type="datetimeFigureOut">
               <a:rPr lang="es-ES" smtClean="0"/>
-              <a:t>29/01/2024</a:t>
+              <a:t>31/01/2024</a:t>
             </a:fld>
             <a:endParaRPr lang="es-ES"/>
           </a:p>
@@ -3344,7 +3648,7 @@
           <a:p>
             <a:fld id="{3B30799D-08C4-469E-966B-49D3B77473EF}" type="datetimeFigureOut">
               <a:rPr lang="es-ES" smtClean="0"/>
-              <a:t>29/01/2024</a:t>
+              <a:t>31/01/2024</a:t>
             </a:fld>
             <a:endParaRPr lang="es-ES"/>
           </a:p>
@@ -3587,7 +3891,7 @@
           <a:p>
             <a:fld id="{3B30799D-08C4-469E-966B-49D3B77473EF}" type="datetimeFigureOut">
               <a:rPr lang="es-ES" smtClean="0"/>
-              <a:t>29/01/2024</a:t>
+              <a:t>31/01/2024</a:t>
             </a:fld>
             <a:endParaRPr lang="es-ES"/>
           </a:p>
@@ -4045,6 +4349,232 @@
 </p:sld>
 </file>
 
+<file path=ppt/slides/slide10.xml><?xml version="1.0" encoding="utf-8"?>
+<p:sld xmlns:a="http://schemas.openxmlformats.org/drawingml/2006/main" xmlns:r="http://schemas.openxmlformats.org/officeDocument/2006/relationships" xmlns:p="http://schemas.openxmlformats.org/presentationml/2006/main">
+  <p:cSld>
+    <p:spTree>
+      <p:nvGrpSpPr>
+        <p:cNvPr id="1" name=""/>
+        <p:cNvGrpSpPr/>
+        <p:nvPr/>
+      </p:nvGrpSpPr>
+      <p:grpSpPr>
+        <a:xfrm>
+          <a:off x="0" y="0"/>
+          <a:ext cx="0" cy="0"/>
+          <a:chOff x="0" y="0"/>
+          <a:chExt cx="0" cy="0"/>
+        </a:xfrm>
+      </p:grpSpPr>
+      <p:sp>
+        <p:nvSpPr>
+          <p:cNvPr id="2" name="Rectangle 1">
+            <a:extLst>
+              <a:ext uri="{FF2B5EF4-FFF2-40B4-BE49-F238E27FC236}">
+                <a16:creationId xmlns:a16="http://schemas.microsoft.com/office/drawing/2014/main" id="{2EE9AE6D-C3C9-B79C-823E-D72075B790B1}"/>
+              </a:ext>
+            </a:extLst>
+          </p:cNvPr>
+          <p:cNvSpPr/>
+          <p:nvPr/>
+        </p:nvSpPr>
+        <p:spPr>
+          <a:xfrm>
+            <a:off x="4496363" y="536956"/>
+            <a:ext cx="3199274" cy="923330"/>
+          </a:xfrm>
+          <a:prstGeom prst="rect">
+            <a:avLst/>
+          </a:prstGeom>
+          <a:noFill/>
+        </p:spPr>
+        <p:txBody>
+          <a:bodyPr wrap="none" lIns="91440" tIns="45720" rIns="91440" bIns="45720">
+            <a:spAutoFit/>
+          </a:bodyPr>
+          <a:lstStyle/>
+          <a:p>
+            <a:pPr algn="ctr"/>
+            <a:r>
+              <a:rPr lang="en-GB" sz="5400" b="0" cap="none" spc="0" dirty="0">
+                <a:ln w="0"/>
+                <a:solidFill>
+                  <a:schemeClr val="tx1"/>
+                </a:solidFill>
+                <a:effectLst>
+                  <a:outerShdw blurRad="38100" dist="19050" dir="2700000" algn="tl" rotWithShape="0">
+                    <a:schemeClr val="dk1">
+                      <a:alpha val="40000"/>
+                    </a:schemeClr>
+                  </a:outerShdw>
+                </a:effectLst>
+              </a:rPr>
+              <a:t>LOCALGINI</a:t>
+            </a:r>
+          </a:p>
+        </p:txBody>
+      </p:sp>
+      <p:sp>
+        <p:nvSpPr>
+          <p:cNvPr id="3" name="TextBox 2">
+            <a:extLst>
+              <a:ext uri="{FF2B5EF4-FFF2-40B4-BE49-F238E27FC236}">
+                <a16:creationId xmlns:a16="http://schemas.microsoft.com/office/drawing/2014/main" id="{2FBE8B20-51C0-8E26-FC21-C2F4C58FB329}"/>
+              </a:ext>
+            </a:extLst>
+          </p:cNvPr>
+          <p:cNvSpPr txBox="1"/>
+          <p:nvPr/>
+        </p:nvSpPr>
+        <p:spPr>
+          <a:xfrm>
+            <a:off x="1010653" y="1828800"/>
+            <a:ext cx="1596591" cy="369332"/>
+          </a:xfrm>
+          <a:prstGeom prst="rect">
+            <a:avLst/>
+          </a:prstGeom>
+          <a:noFill/>
+        </p:spPr>
+        <p:txBody>
+          <a:bodyPr wrap="none" rtlCol="0">
+            <a:spAutoFit/>
+          </a:bodyPr>
+          <a:lstStyle/>
+          <a:p>
+            <a:r>
+              <a:rPr lang="es-ES" dirty="0"/>
+              <a:t>Gini </a:t>
+            </a:r>
+            <a:r>
+              <a:rPr lang="es-ES" dirty="0" err="1"/>
+              <a:t>coefficient</a:t>
+            </a:r>
+            <a:endParaRPr lang="es-ES" dirty="0"/>
+          </a:p>
+        </p:txBody>
+      </p:sp>
+      <p:pic>
+        <p:nvPicPr>
+          <p:cNvPr id="5" name="Picture 4">
+            <a:extLst>
+              <a:ext uri="{FF2B5EF4-FFF2-40B4-BE49-F238E27FC236}">
+                <a16:creationId xmlns:a16="http://schemas.microsoft.com/office/drawing/2014/main" id="{7DEA88F9-64C0-D0CC-1C92-D12C801C7B0C}"/>
+              </a:ext>
+            </a:extLst>
+          </p:cNvPr>
+          <p:cNvPicPr>
+            <a:picLocks noChangeAspect="1"/>
+          </p:cNvPicPr>
+          <p:nvPr/>
+        </p:nvPicPr>
+        <p:blipFill>
+          <a:blip r:embed="rId3"/>
+          <a:stretch>
+            <a:fillRect/>
+          </a:stretch>
+        </p:blipFill>
+        <p:spPr>
+          <a:xfrm>
+            <a:off x="332497" y="2700732"/>
+            <a:ext cx="2952902" cy="927148"/>
+          </a:xfrm>
+          <a:prstGeom prst="rect">
+            <a:avLst/>
+          </a:prstGeom>
+        </p:spPr>
+      </p:pic>
+    </p:spTree>
+    <p:extLst>
+      <p:ext uri="{BB962C8B-B14F-4D97-AF65-F5344CB8AC3E}">
+        <p14:creationId xmlns:p14="http://schemas.microsoft.com/office/powerpoint/2010/main" val="2498770784"/>
+      </p:ext>
+    </p:extLst>
+  </p:cSld>
+  <p:clrMapOvr>
+    <a:masterClrMapping/>
+  </p:clrMapOvr>
+</p:sld>
+</file>
+
+<file path=ppt/slides/slide11.xml><?xml version="1.0" encoding="utf-8"?>
+<p:sld xmlns:a="http://schemas.openxmlformats.org/drawingml/2006/main" xmlns:r="http://schemas.openxmlformats.org/officeDocument/2006/relationships" xmlns:p="http://schemas.openxmlformats.org/presentationml/2006/main">
+  <p:cSld>
+    <p:spTree>
+      <p:nvGrpSpPr>
+        <p:cNvPr id="1" name=""/>
+        <p:cNvGrpSpPr/>
+        <p:nvPr/>
+      </p:nvGrpSpPr>
+      <p:grpSpPr>
+        <a:xfrm>
+          <a:off x="0" y="0"/>
+          <a:ext cx="0" cy="0"/>
+          <a:chOff x="0" y="0"/>
+          <a:chExt cx="0" cy="0"/>
+        </a:xfrm>
+      </p:grpSpPr>
+      <p:sp>
+        <p:nvSpPr>
+          <p:cNvPr id="2" name="Rectangle 1">
+            <a:extLst>
+              <a:ext uri="{FF2B5EF4-FFF2-40B4-BE49-F238E27FC236}">
+                <a16:creationId xmlns:a16="http://schemas.microsoft.com/office/drawing/2014/main" id="{2DBBD0B3-3302-D276-E085-307880CCF2B7}"/>
+              </a:ext>
+            </a:extLst>
+          </p:cNvPr>
+          <p:cNvSpPr/>
+          <p:nvPr/>
+        </p:nvSpPr>
+        <p:spPr>
+          <a:xfrm>
+            <a:off x="4720239" y="382885"/>
+            <a:ext cx="2751522" cy="923330"/>
+          </a:xfrm>
+          <a:prstGeom prst="rect">
+            <a:avLst/>
+          </a:prstGeom>
+          <a:noFill/>
+        </p:spPr>
+        <p:txBody>
+          <a:bodyPr wrap="none" lIns="91440" tIns="45720" rIns="91440" bIns="45720">
+            <a:spAutoFit/>
+          </a:bodyPr>
+          <a:lstStyle/>
+          <a:p>
+            <a:pPr algn="ctr"/>
+            <a:r>
+              <a:rPr lang="en-GB" sz="5400" b="0" cap="none" spc="0" dirty="0">
+                <a:ln w="0"/>
+                <a:solidFill>
+                  <a:schemeClr val="tx1"/>
+                </a:solidFill>
+                <a:effectLst>
+                  <a:outerShdw blurRad="38100" dist="19050" dir="2700000" algn="tl" rotWithShape="0">
+                    <a:schemeClr val="dk1">
+                      <a:alpha val="40000"/>
+                    </a:schemeClr>
+                  </a:outerShdw>
+                </a:effectLst>
+              </a:rPr>
+              <a:t>STANDEP</a:t>
+            </a:r>
+          </a:p>
+        </p:txBody>
+      </p:sp>
+    </p:spTree>
+    <p:extLst>
+      <p:ext uri="{BB962C8B-B14F-4D97-AF65-F5344CB8AC3E}">
+        <p14:creationId xmlns:p14="http://schemas.microsoft.com/office/powerpoint/2010/main" val="2537575845"/>
+      </p:ext>
+    </p:extLst>
+  </p:cSld>
+  <p:clrMapOvr>
+    <a:masterClrMapping/>
+  </p:clrMapOvr>
+</p:sld>
+</file>
+
 <file path=ppt/slides/slide2.xml><?xml version="1.0" encoding="utf-8"?>
 <p:sld xmlns:a="http://schemas.openxmlformats.org/drawingml/2006/main" xmlns:r="http://schemas.openxmlformats.org/officeDocument/2006/relationships" xmlns:p="http://schemas.openxmlformats.org/presentationml/2006/main">
   <p:cSld>
@@ -6264,10 +6794,772 @@
           <a:chExt cx="0" cy="0"/>
         </a:xfrm>
       </p:grpSpPr>
+      <p:sp>
+        <p:nvSpPr>
+          <p:cNvPr id="2" name="Rectangle 1">
+            <a:extLst>
+              <a:ext uri="{FF2B5EF4-FFF2-40B4-BE49-F238E27FC236}">
+                <a16:creationId xmlns:a16="http://schemas.microsoft.com/office/drawing/2014/main" id="{E52CC449-3681-A58A-0AF6-397563EC3662}"/>
+              </a:ext>
+            </a:extLst>
+          </p:cNvPr>
+          <p:cNvSpPr/>
+          <p:nvPr/>
+        </p:nvSpPr>
+        <p:spPr>
+          <a:xfrm>
+            <a:off x="3208029" y="401935"/>
+            <a:ext cx="5775940" cy="923330"/>
+          </a:xfrm>
+          <a:prstGeom prst="rect">
+            <a:avLst/>
+          </a:prstGeom>
+          <a:noFill/>
+        </p:spPr>
+        <p:txBody>
+          <a:bodyPr wrap="none" lIns="91440" tIns="45720" rIns="91440" bIns="45720">
+            <a:spAutoFit/>
+          </a:bodyPr>
+          <a:lstStyle/>
+          <a:p>
+            <a:pPr algn="ctr"/>
+            <a:r>
+              <a:rPr lang="en-GB" sz="5400" b="0" cap="none" spc="0" dirty="0">
+                <a:ln w="0"/>
+                <a:solidFill>
+                  <a:schemeClr val="tx1"/>
+                </a:solidFill>
+                <a:effectLst>
+                  <a:outerShdw blurRad="38100" dist="19050" dir="2700000" algn="tl" rotWithShape="0">
+                    <a:schemeClr val="dk1">
+                      <a:alpha val="40000"/>
+                    </a:schemeClr>
+                  </a:outerShdw>
+                </a:effectLst>
+              </a:rPr>
+              <a:t>LOCALT2 FUNCTION</a:t>
+            </a:r>
+          </a:p>
+        </p:txBody>
+      </p:sp>
+      <p:sp>
+        <p:nvSpPr>
+          <p:cNvPr id="3" name="TextBox 2">
+            <a:extLst>
+              <a:ext uri="{FF2B5EF4-FFF2-40B4-BE49-F238E27FC236}">
+                <a16:creationId xmlns:a16="http://schemas.microsoft.com/office/drawing/2014/main" id="{FD852611-B55E-A45C-5B7A-D314213F5EEB}"/>
+              </a:ext>
+            </a:extLst>
+          </p:cNvPr>
+          <p:cNvSpPr txBox="1"/>
+          <p:nvPr/>
+        </p:nvSpPr>
+        <p:spPr>
+          <a:xfrm>
+            <a:off x="482600" y="2413000"/>
+            <a:ext cx="2698750" cy="646331"/>
+          </a:xfrm>
+          <a:prstGeom prst="rect">
+            <a:avLst/>
+          </a:prstGeom>
+          <a:noFill/>
+        </p:spPr>
+        <p:txBody>
+          <a:bodyPr wrap="square" rtlCol="0">
+            <a:spAutoFit/>
+          </a:bodyPr>
+          <a:lstStyle/>
+          <a:p>
+            <a:r>
+              <a:rPr lang="es-ES" dirty="0"/>
+              <a:t>Set </a:t>
+            </a:r>
+            <a:r>
+              <a:rPr lang="es-ES" dirty="0" err="1"/>
+              <a:t>upper</a:t>
+            </a:r>
+            <a:r>
+              <a:rPr lang="es-ES" dirty="0"/>
+              <a:t> and </a:t>
+            </a:r>
+            <a:r>
+              <a:rPr lang="es-ES" dirty="0" err="1"/>
+              <a:t>lower</a:t>
+            </a:r>
+            <a:r>
+              <a:rPr lang="es-ES" dirty="0"/>
+              <a:t> </a:t>
+            </a:r>
+            <a:r>
+              <a:rPr lang="es-ES" dirty="0" err="1"/>
+              <a:t>threshold</a:t>
+            </a:r>
+            <a:endParaRPr lang="es-ES" dirty="0"/>
+          </a:p>
+        </p:txBody>
+      </p:sp>
+      <p:sp>
+        <p:nvSpPr>
+          <p:cNvPr id="4" name="TextBox 3">
+            <a:extLst>
+              <a:ext uri="{FF2B5EF4-FFF2-40B4-BE49-F238E27FC236}">
+                <a16:creationId xmlns:a16="http://schemas.microsoft.com/office/drawing/2014/main" id="{0B496ECD-CFE5-DB5D-95EB-9D599B89462E}"/>
+              </a:ext>
+            </a:extLst>
+          </p:cNvPr>
+          <p:cNvSpPr txBox="1"/>
+          <p:nvPr/>
+        </p:nvSpPr>
+        <p:spPr>
+          <a:xfrm>
+            <a:off x="4019551" y="2413000"/>
+            <a:ext cx="3492500" cy="646331"/>
+          </a:xfrm>
+          <a:prstGeom prst="rect">
+            <a:avLst/>
+          </a:prstGeom>
+          <a:noFill/>
+        </p:spPr>
+        <p:txBody>
+          <a:bodyPr wrap="square" rtlCol="0">
+            <a:spAutoFit/>
+          </a:bodyPr>
+          <a:lstStyle/>
+          <a:p>
+            <a:r>
+              <a:rPr lang="es-ES" dirty="0"/>
+              <a:t>If data </a:t>
+            </a:r>
+            <a:r>
+              <a:rPr lang="es-ES" dirty="0" err="1"/>
+              <a:t>is</a:t>
+            </a:r>
+            <a:r>
+              <a:rPr lang="es-ES" dirty="0"/>
+              <a:t> </a:t>
+            </a:r>
+            <a:r>
+              <a:rPr lang="es-ES" dirty="0" err="1"/>
+              <a:t>above</a:t>
+            </a:r>
+            <a:r>
+              <a:rPr lang="es-ES" dirty="0"/>
+              <a:t> </a:t>
+            </a:r>
+            <a:r>
+              <a:rPr lang="es-ES" dirty="0" err="1"/>
+              <a:t>upper</a:t>
+            </a:r>
+            <a:r>
+              <a:rPr lang="es-ES" dirty="0"/>
+              <a:t> </a:t>
+            </a:r>
+            <a:r>
+              <a:rPr lang="es-ES" dirty="0" err="1"/>
+              <a:t>threshold</a:t>
+            </a:r>
+            <a:r>
+              <a:rPr lang="es-ES" dirty="0"/>
+              <a:t> = </a:t>
+            </a:r>
+            <a:r>
+              <a:rPr lang="es-ES" dirty="0" err="1"/>
+              <a:t>upper</a:t>
+            </a:r>
+            <a:r>
+              <a:rPr lang="es-ES" dirty="0"/>
+              <a:t> </a:t>
+            </a:r>
+            <a:r>
+              <a:rPr lang="es-ES" dirty="0" err="1"/>
+              <a:t>threshold</a:t>
+            </a:r>
+            <a:endParaRPr lang="es-ES" dirty="0"/>
+          </a:p>
+        </p:txBody>
+      </p:sp>
+      <p:sp>
+        <p:nvSpPr>
+          <p:cNvPr id="5" name="TextBox 4">
+            <a:extLst>
+              <a:ext uri="{FF2B5EF4-FFF2-40B4-BE49-F238E27FC236}">
+                <a16:creationId xmlns:a16="http://schemas.microsoft.com/office/drawing/2014/main" id="{A84FBC1D-C7BB-DB40-1500-C04E8CB76497}"/>
+              </a:ext>
+            </a:extLst>
+          </p:cNvPr>
+          <p:cNvSpPr txBox="1"/>
+          <p:nvPr/>
+        </p:nvSpPr>
+        <p:spPr>
+          <a:xfrm>
+            <a:off x="8510621" y="2409622"/>
+            <a:ext cx="3357123" cy="646331"/>
+          </a:xfrm>
+          <a:prstGeom prst="rect">
+            <a:avLst/>
+          </a:prstGeom>
+          <a:noFill/>
+        </p:spPr>
+        <p:txBody>
+          <a:bodyPr wrap="square" rtlCol="0">
+            <a:spAutoFit/>
+          </a:bodyPr>
+          <a:lstStyle/>
+          <a:p>
+            <a:r>
+              <a:rPr lang="es-ES" dirty="0" err="1"/>
+              <a:t>Below</a:t>
+            </a:r>
+            <a:r>
+              <a:rPr lang="es-ES" dirty="0"/>
+              <a:t> </a:t>
+            </a:r>
+            <a:r>
+              <a:rPr lang="es-ES" dirty="0" err="1"/>
+              <a:t>upper</a:t>
+            </a:r>
+            <a:r>
+              <a:rPr lang="es-ES" dirty="0"/>
+              <a:t> </a:t>
+            </a:r>
+            <a:r>
+              <a:rPr lang="es-ES" dirty="0" err="1"/>
+              <a:t>theshold</a:t>
+            </a:r>
+            <a:r>
+              <a:rPr lang="es-ES" dirty="0"/>
+              <a:t> -&gt; Mean </a:t>
+            </a:r>
+            <a:r>
+              <a:rPr lang="es-ES" dirty="0" err="1"/>
+              <a:t>value</a:t>
+            </a:r>
+            <a:r>
+              <a:rPr lang="es-ES" dirty="0"/>
+              <a:t> </a:t>
+            </a:r>
+            <a:r>
+              <a:rPr lang="es-ES" dirty="0" err="1"/>
+              <a:t>or</a:t>
+            </a:r>
+            <a:r>
+              <a:rPr lang="es-ES" dirty="0"/>
+              <a:t> </a:t>
+            </a:r>
+            <a:r>
+              <a:rPr lang="es-ES" dirty="0" err="1"/>
+              <a:t>lower</a:t>
+            </a:r>
+            <a:r>
+              <a:rPr lang="es-ES" dirty="0"/>
+              <a:t> </a:t>
+            </a:r>
+            <a:r>
+              <a:rPr lang="es-ES" dirty="0" err="1"/>
+              <a:t>threshold</a:t>
+            </a:r>
+            <a:r>
+              <a:rPr lang="es-ES" dirty="0"/>
+              <a:t> </a:t>
+            </a:r>
+          </a:p>
+        </p:txBody>
+      </p:sp>
+      <p:sp>
+        <p:nvSpPr>
+          <p:cNvPr id="6" name="TextBox 5">
+            <a:extLst>
+              <a:ext uri="{FF2B5EF4-FFF2-40B4-BE49-F238E27FC236}">
+                <a16:creationId xmlns:a16="http://schemas.microsoft.com/office/drawing/2014/main" id="{62C3D8CA-5A08-40CD-AC8C-C00715C80D50}"/>
+              </a:ext>
+            </a:extLst>
+          </p:cNvPr>
+          <p:cNvSpPr txBox="1"/>
+          <p:nvPr/>
+        </p:nvSpPr>
+        <p:spPr>
+          <a:xfrm>
+            <a:off x="7861300" y="4140200"/>
+            <a:ext cx="4006444" cy="646331"/>
+          </a:xfrm>
+          <a:prstGeom prst="rect">
+            <a:avLst/>
+          </a:prstGeom>
+          <a:noFill/>
+        </p:spPr>
+        <p:txBody>
+          <a:bodyPr wrap="square" rtlCol="0">
+            <a:spAutoFit/>
+          </a:bodyPr>
+          <a:lstStyle/>
+          <a:p>
+            <a:r>
+              <a:rPr lang="es-ES" dirty="0"/>
+              <a:t>Set the </a:t>
+            </a:r>
+            <a:r>
+              <a:rPr lang="es-ES" dirty="0" err="1"/>
+              <a:t>values</a:t>
+            </a:r>
+            <a:r>
+              <a:rPr lang="es-ES" dirty="0"/>
+              <a:t> -&gt; </a:t>
+            </a:r>
+            <a:r>
+              <a:rPr lang="es-ES" dirty="0" err="1"/>
+              <a:t>upper</a:t>
+            </a:r>
+            <a:r>
+              <a:rPr lang="es-ES" dirty="0"/>
+              <a:t> – mean </a:t>
+            </a:r>
+            <a:r>
+              <a:rPr lang="es-ES" dirty="0" err="1"/>
+              <a:t>or</a:t>
+            </a:r>
+            <a:r>
+              <a:rPr lang="es-ES" dirty="0"/>
+              <a:t> </a:t>
+            </a:r>
+            <a:r>
+              <a:rPr lang="es-ES" dirty="0" err="1"/>
+              <a:t>lower</a:t>
+            </a:r>
+            <a:r>
+              <a:rPr lang="es-ES" dirty="0"/>
+              <a:t> </a:t>
+            </a:r>
+            <a:r>
+              <a:rPr lang="es-ES" dirty="0" err="1"/>
+              <a:t>threshold</a:t>
+            </a:r>
+            <a:endParaRPr lang="es-ES" dirty="0"/>
+          </a:p>
+        </p:txBody>
+      </p:sp>
+      <p:sp>
+        <p:nvSpPr>
+          <p:cNvPr id="7" name="TextBox 6">
+            <a:extLst>
+              <a:ext uri="{FF2B5EF4-FFF2-40B4-BE49-F238E27FC236}">
+                <a16:creationId xmlns:a16="http://schemas.microsoft.com/office/drawing/2014/main" id="{F2978384-F83E-6E4F-082A-A8AF662CEE3F}"/>
+              </a:ext>
+            </a:extLst>
+          </p:cNvPr>
+          <p:cNvSpPr txBox="1"/>
+          <p:nvPr/>
+        </p:nvSpPr>
+        <p:spPr>
+          <a:xfrm>
+            <a:off x="4019551" y="4432300"/>
+            <a:ext cx="1683153" cy="369332"/>
+          </a:xfrm>
+          <a:prstGeom prst="rect">
+            <a:avLst/>
+          </a:prstGeom>
+          <a:noFill/>
+        </p:spPr>
+        <p:txBody>
+          <a:bodyPr wrap="none" rtlCol="0">
+            <a:spAutoFit/>
+          </a:bodyPr>
+          <a:lstStyle/>
+          <a:p>
+            <a:r>
+              <a:rPr lang="es-ES" dirty="0" err="1"/>
+              <a:t>Exp</a:t>
+            </a:r>
+            <a:r>
+              <a:rPr lang="es-ES" dirty="0"/>
+              <a:t> data / </a:t>
+            </a:r>
+            <a:r>
+              <a:rPr lang="es-ES" dirty="0" err="1"/>
+              <a:t>value</a:t>
+            </a:r>
+            <a:endParaRPr lang="es-ES" dirty="0"/>
+          </a:p>
+        </p:txBody>
+      </p:sp>
     </p:spTree>
     <p:extLst>
       <p:ext uri="{BB962C8B-B14F-4D97-AF65-F5344CB8AC3E}">
         <p14:creationId xmlns:p14="http://schemas.microsoft.com/office/powerpoint/2010/main" val="3483868800"/>
+      </p:ext>
+    </p:extLst>
+  </p:cSld>
+  <p:clrMapOvr>
+    <a:masterClrMapping/>
+  </p:clrMapOvr>
+</p:sld>
+</file>
+
+<file path=ppt/slides/slide9.xml><?xml version="1.0" encoding="utf-8"?>
+<p:sld xmlns:a="http://schemas.openxmlformats.org/drawingml/2006/main" xmlns:r="http://schemas.openxmlformats.org/officeDocument/2006/relationships" xmlns:p="http://schemas.openxmlformats.org/presentationml/2006/main">
+  <p:cSld>
+    <p:spTree>
+      <p:nvGrpSpPr>
+        <p:cNvPr id="1" name=""/>
+        <p:cNvGrpSpPr/>
+        <p:nvPr/>
+      </p:nvGrpSpPr>
+      <p:grpSpPr>
+        <a:xfrm>
+          <a:off x="0" y="0"/>
+          <a:ext cx="0" cy="0"/>
+          <a:chOff x="0" y="0"/>
+          <a:chExt cx="0" cy="0"/>
+        </a:xfrm>
+      </p:grpSpPr>
+      <p:sp>
+        <p:nvSpPr>
+          <p:cNvPr id="2" name="Rectangle 1">
+            <a:extLst>
+              <a:ext uri="{FF2B5EF4-FFF2-40B4-BE49-F238E27FC236}">
+                <a16:creationId xmlns:a16="http://schemas.microsoft.com/office/drawing/2014/main" id="{BF7F1E8E-626D-5A6C-A874-6BE52166F9B7}"/>
+              </a:ext>
+            </a:extLst>
+          </p:cNvPr>
+          <p:cNvSpPr/>
+          <p:nvPr/>
+        </p:nvSpPr>
+        <p:spPr>
+          <a:xfrm>
+            <a:off x="4496363" y="217785"/>
+            <a:ext cx="3199274" cy="923330"/>
+          </a:xfrm>
+          <a:prstGeom prst="rect">
+            <a:avLst/>
+          </a:prstGeom>
+          <a:noFill/>
+        </p:spPr>
+        <p:txBody>
+          <a:bodyPr wrap="none" lIns="91440" tIns="45720" rIns="91440" bIns="45720">
+            <a:spAutoFit/>
+          </a:bodyPr>
+          <a:lstStyle/>
+          <a:p>
+            <a:pPr algn="ctr"/>
+            <a:r>
+              <a:rPr lang="en-GB" sz="5400" b="0" cap="none" spc="0" dirty="0">
+                <a:ln w="0"/>
+                <a:solidFill>
+                  <a:schemeClr val="tx1"/>
+                </a:solidFill>
+                <a:effectLst>
+                  <a:outerShdw blurRad="38100" dist="19050" dir="2700000" algn="tl" rotWithShape="0">
+                    <a:schemeClr val="dk1">
+                      <a:alpha val="40000"/>
+                    </a:schemeClr>
+                  </a:outerShdw>
+                </a:effectLst>
+              </a:rPr>
+              <a:t>LOCALGINI</a:t>
+            </a:r>
+          </a:p>
+        </p:txBody>
+      </p:sp>
+      <p:sp>
+        <p:nvSpPr>
+          <p:cNvPr id="3" name="TextBox 2">
+            <a:extLst>
+              <a:ext uri="{FF2B5EF4-FFF2-40B4-BE49-F238E27FC236}">
+                <a16:creationId xmlns:a16="http://schemas.microsoft.com/office/drawing/2014/main" id="{1C4F3A09-5359-D1F8-7CE4-1C5803EE33D9}"/>
+              </a:ext>
+            </a:extLst>
+          </p:cNvPr>
+          <p:cNvSpPr txBox="1"/>
+          <p:nvPr/>
+        </p:nvSpPr>
+        <p:spPr>
+          <a:xfrm>
+            <a:off x="806450" y="1987550"/>
+            <a:ext cx="9836475" cy="369332"/>
+          </a:xfrm>
+          <a:prstGeom prst="rect">
+            <a:avLst/>
+          </a:prstGeom>
+          <a:noFill/>
+        </p:spPr>
+        <p:txBody>
+          <a:bodyPr wrap="none" rtlCol="0">
+            <a:spAutoFit/>
+          </a:bodyPr>
+          <a:lstStyle/>
+          <a:p>
+            <a:r>
+              <a:rPr lang="es-ES" b="1" u="sng" dirty="0"/>
+              <a:t>Gini </a:t>
+            </a:r>
+            <a:r>
+              <a:rPr lang="es-ES" b="1" u="sng" dirty="0" err="1"/>
+              <a:t>coefficient</a:t>
+            </a:r>
+            <a:r>
+              <a:rPr lang="es-ES" b="1" u="sng" dirty="0"/>
+              <a:t>:  </a:t>
+            </a:r>
+            <a:r>
+              <a:rPr lang="en-US" dirty="0"/>
+              <a:t>a measure of inequality between two variables, where 0 is equality and 1 is inequality.</a:t>
+            </a:r>
+            <a:endParaRPr lang="es-ES" dirty="0"/>
+          </a:p>
+        </p:txBody>
+      </p:sp>
+      <p:sp>
+        <p:nvSpPr>
+          <p:cNvPr id="4" name="TextBox 3">
+            <a:extLst>
+              <a:ext uri="{FF2B5EF4-FFF2-40B4-BE49-F238E27FC236}">
+                <a16:creationId xmlns:a16="http://schemas.microsoft.com/office/drawing/2014/main" id="{17CC86A6-B5C0-E541-7760-09755E84B127}"/>
+              </a:ext>
+            </a:extLst>
+          </p:cNvPr>
+          <p:cNvSpPr txBox="1"/>
+          <p:nvPr/>
+        </p:nvSpPr>
+        <p:spPr>
+          <a:xfrm>
+            <a:off x="603250" y="6191250"/>
+            <a:ext cx="8603637" cy="230832"/>
+          </a:xfrm>
+          <a:prstGeom prst="rect">
+            <a:avLst/>
+          </a:prstGeom>
+          <a:noFill/>
+        </p:spPr>
+        <p:txBody>
+          <a:bodyPr wrap="none" rtlCol="0">
+            <a:spAutoFit/>
+          </a:bodyPr>
+          <a:lstStyle/>
+          <a:p>
+            <a:r>
+              <a:rPr lang="en-US" sz="900" b="0" i="0" dirty="0">
+                <a:solidFill>
+                  <a:srgbClr val="222222"/>
+                </a:solidFill>
+                <a:effectLst/>
+                <a:latin typeface="Arial" panose="020B0604020202020204" pitchFamily="34" charset="0"/>
+              </a:rPr>
+              <a:t>Kumar S, P., &amp; Bhatt, N. (2023). </a:t>
+            </a:r>
+            <a:r>
+              <a:rPr lang="en-US" sz="900" b="0" i="0" dirty="0" err="1">
+                <a:solidFill>
+                  <a:srgbClr val="222222"/>
+                </a:solidFill>
+                <a:effectLst/>
+                <a:latin typeface="Arial" panose="020B0604020202020204" pitchFamily="34" charset="0"/>
+              </a:rPr>
+              <a:t>Localgini</a:t>
+            </a:r>
+            <a:r>
+              <a:rPr lang="en-US" sz="900" b="0" i="0" dirty="0">
+                <a:solidFill>
+                  <a:srgbClr val="222222"/>
+                </a:solidFill>
+                <a:effectLst/>
+                <a:latin typeface="Arial" panose="020B0604020202020204" pitchFamily="34" charset="0"/>
+              </a:rPr>
+              <a:t>: A method for harnessing inequality in gene expression to improve the quality of context-specific models. </a:t>
+            </a:r>
+            <a:r>
+              <a:rPr lang="en-US" sz="900" b="0" i="1" dirty="0" err="1">
+                <a:solidFill>
+                  <a:srgbClr val="222222"/>
+                </a:solidFill>
+                <a:effectLst/>
+                <a:latin typeface="Arial" panose="020B0604020202020204" pitchFamily="34" charset="0"/>
+              </a:rPr>
+              <a:t>bioRxiv</a:t>
+            </a:r>
+            <a:r>
+              <a:rPr lang="en-US" sz="900" b="0" i="0" dirty="0">
+                <a:solidFill>
+                  <a:srgbClr val="222222"/>
+                </a:solidFill>
+                <a:effectLst/>
+                <a:latin typeface="Arial" panose="020B0604020202020204" pitchFamily="34" charset="0"/>
+              </a:rPr>
+              <a:t>, 2023-09.</a:t>
+            </a:r>
+            <a:endParaRPr lang="es-ES" sz="900" dirty="0"/>
+          </a:p>
+        </p:txBody>
+      </p:sp>
+      <p:sp>
+        <p:nvSpPr>
+          <p:cNvPr id="5" name="TextBox 4">
+            <a:extLst>
+              <a:ext uri="{FF2B5EF4-FFF2-40B4-BE49-F238E27FC236}">
+                <a16:creationId xmlns:a16="http://schemas.microsoft.com/office/drawing/2014/main" id="{D6CE7CEB-B694-2F79-E157-7664C60C7DC1}"/>
+              </a:ext>
+            </a:extLst>
+          </p:cNvPr>
+          <p:cNvSpPr txBox="1"/>
+          <p:nvPr/>
+        </p:nvSpPr>
+        <p:spPr>
+          <a:xfrm>
+            <a:off x="806450" y="2535503"/>
+            <a:ext cx="4026487" cy="369332"/>
+          </a:xfrm>
+          <a:prstGeom prst="rect">
+            <a:avLst/>
+          </a:prstGeom>
+          <a:noFill/>
+        </p:spPr>
+        <p:txBody>
+          <a:bodyPr wrap="none" rtlCol="0">
+            <a:spAutoFit/>
+          </a:bodyPr>
+          <a:lstStyle/>
+          <a:p>
+            <a:r>
+              <a:rPr lang="es-ES" dirty="0" err="1"/>
+              <a:t>Establish</a:t>
+            </a:r>
+            <a:r>
+              <a:rPr lang="es-ES" dirty="0"/>
+              <a:t> </a:t>
+            </a:r>
+            <a:r>
+              <a:rPr lang="es-ES" dirty="0" err="1"/>
+              <a:t>core</a:t>
+            </a:r>
+            <a:r>
+              <a:rPr lang="es-ES" dirty="0"/>
+              <a:t> genes -&gt; set </a:t>
+            </a:r>
+            <a:r>
+              <a:rPr lang="es-ES" dirty="0" err="1"/>
+              <a:t>core</a:t>
+            </a:r>
+            <a:r>
+              <a:rPr lang="es-ES" dirty="0"/>
+              <a:t> </a:t>
+            </a:r>
+            <a:r>
+              <a:rPr lang="es-ES" dirty="0" err="1"/>
+              <a:t>reactions</a:t>
+            </a:r>
+            <a:endParaRPr lang="es-ES" dirty="0"/>
+          </a:p>
+        </p:txBody>
+      </p:sp>
+      <p:sp>
+        <p:nvSpPr>
+          <p:cNvPr id="6" name="TextBox 5">
+            <a:extLst>
+              <a:ext uri="{FF2B5EF4-FFF2-40B4-BE49-F238E27FC236}">
+                <a16:creationId xmlns:a16="http://schemas.microsoft.com/office/drawing/2014/main" id="{2BEFC1EE-0C7A-1A81-C43F-7C3C99332E24}"/>
+              </a:ext>
+            </a:extLst>
+          </p:cNvPr>
+          <p:cNvSpPr txBox="1"/>
+          <p:nvPr/>
+        </p:nvSpPr>
+        <p:spPr>
+          <a:xfrm>
+            <a:off x="926432" y="1624263"/>
+            <a:ext cx="10172528" cy="369332"/>
+          </a:xfrm>
+          <a:prstGeom prst="rect">
+            <a:avLst/>
+          </a:prstGeom>
+          <a:noFill/>
+        </p:spPr>
+        <p:txBody>
+          <a:bodyPr wrap="none" rtlCol="0">
+            <a:spAutoFit/>
+          </a:bodyPr>
+          <a:lstStyle/>
+          <a:p>
+            <a:r>
+              <a:rPr lang="es-ES" dirty="0"/>
+              <a:t>Gene-</a:t>
+            </a:r>
+            <a:r>
+              <a:rPr lang="es-ES" dirty="0" err="1"/>
+              <a:t>specific</a:t>
+            </a:r>
+            <a:r>
+              <a:rPr lang="es-ES" dirty="0"/>
+              <a:t> </a:t>
+            </a:r>
+            <a:r>
+              <a:rPr lang="es-ES" dirty="0" err="1"/>
+              <a:t>thresholding</a:t>
+            </a:r>
+            <a:r>
+              <a:rPr lang="es-ES" dirty="0"/>
+              <a:t> </a:t>
+            </a:r>
+            <a:r>
+              <a:rPr lang="es-ES" dirty="0" err="1"/>
+              <a:t>method</a:t>
+            </a:r>
+            <a:r>
+              <a:rPr lang="es-ES" dirty="0"/>
+              <a:t>. Different </a:t>
+            </a:r>
+            <a:r>
+              <a:rPr lang="es-ES" dirty="0" err="1"/>
+              <a:t>threshold</a:t>
+            </a:r>
+            <a:r>
+              <a:rPr lang="es-ES" dirty="0"/>
+              <a:t> </a:t>
+            </a:r>
+            <a:r>
+              <a:rPr lang="es-ES" dirty="0" err="1"/>
+              <a:t>values</a:t>
+            </a:r>
+            <a:r>
+              <a:rPr lang="es-ES" dirty="0"/>
+              <a:t> </a:t>
+            </a:r>
+            <a:r>
+              <a:rPr lang="es-ES" dirty="0" err="1"/>
+              <a:t>for</a:t>
+            </a:r>
+            <a:r>
+              <a:rPr lang="es-ES" dirty="0"/>
+              <a:t> different </a:t>
+            </a:r>
+            <a:r>
+              <a:rPr lang="es-ES" dirty="0" err="1"/>
+              <a:t>based</a:t>
+            </a:r>
+            <a:r>
+              <a:rPr lang="es-ES" dirty="0"/>
+              <a:t> on </a:t>
+            </a:r>
+            <a:r>
+              <a:rPr lang="es-ES" dirty="0" err="1"/>
+              <a:t>their</a:t>
+            </a:r>
+            <a:r>
+              <a:rPr lang="es-ES" dirty="0"/>
+              <a:t> Gini </a:t>
+            </a:r>
+            <a:r>
+              <a:rPr lang="es-ES" dirty="0" err="1"/>
+              <a:t>coefficients</a:t>
+            </a:r>
+            <a:r>
+              <a:rPr lang="es-ES" dirty="0"/>
+              <a:t>.</a:t>
+            </a:r>
+          </a:p>
+        </p:txBody>
+      </p:sp>
+    </p:spTree>
+    <p:extLst>
+      <p:ext uri="{BB962C8B-B14F-4D97-AF65-F5344CB8AC3E}">
+        <p14:creationId xmlns:p14="http://schemas.microsoft.com/office/powerpoint/2010/main" val="1215737357"/>
       </p:ext>
     </p:extLst>
   </p:cSld>

</xml_diff>

<commit_message>
changes in the power point
Actually I'm doing it in canvas that works better
</commit_message>
<xml_diff>
--- a/Thresholding/Thresholding.pptx
+++ b/Thresholding/Thresholding.pptx
@@ -138,18 +138,18 @@
   <pc:docChgLst>
     <pc:chgData name="Pablo Tejero Sanz" userId="9498043962a09e1f" providerId="LiveId" clId="{180266BD-9C8F-4BC4-AEA3-CCB7C1E90ED0}"/>
     <pc:docChg chg="custSel addSld modSld">
-      <pc:chgData name="Pablo Tejero Sanz" userId="9498043962a09e1f" providerId="LiveId" clId="{180266BD-9C8F-4BC4-AEA3-CCB7C1E90ED0}" dt="2024-01-31T12:05:18.197" v="1945" actId="1076"/>
+      <pc:chgData name="Pablo Tejero Sanz" userId="9498043962a09e1f" providerId="LiveId" clId="{180266BD-9C8F-4BC4-AEA3-CCB7C1E90ED0}" dt="2024-02-05T15:57:31.866" v="1947"/>
       <pc:docMkLst>
         <pc:docMk/>
       </pc:docMkLst>
-      <pc:sldChg chg="delSp modSp new mod">
-        <pc:chgData name="Pablo Tejero Sanz" userId="9498043962a09e1f" providerId="LiveId" clId="{180266BD-9C8F-4BC4-AEA3-CCB7C1E90ED0}" dt="2024-01-29T17:39:41.149" v="39" actId="478"/>
+      <pc:sldChg chg="addSp delSp modSp new mod setBg addAnim">
+        <pc:chgData name="Pablo Tejero Sanz" userId="9498043962a09e1f" providerId="LiveId" clId="{180266BD-9C8F-4BC4-AEA3-CCB7C1E90ED0}" dt="2024-02-05T15:57:31.866" v="1947"/>
         <pc:sldMkLst>
           <pc:docMk/>
           <pc:sldMk cId="1425708407" sldId="256"/>
         </pc:sldMkLst>
         <pc:spChg chg="mod">
-          <ac:chgData name="Pablo Tejero Sanz" userId="9498043962a09e1f" providerId="LiveId" clId="{180266BD-9C8F-4BC4-AEA3-CCB7C1E90ED0}" dt="2024-01-29T17:39:37.484" v="38" actId="20577"/>
+          <ac:chgData name="Pablo Tejero Sanz" userId="9498043962a09e1f" providerId="LiveId" clId="{180266BD-9C8F-4BC4-AEA3-CCB7C1E90ED0}" dt="2024-02-05T15:57:31.862" v="1946" actId="26606"/>
           <ac:spMkLst>
             <pc:docMk/>
             <pc:sldMk cId="1425708407" sldId="256"/>
@@ -164,6 +164,22 @@
             <ac:spMk id="3" creationId="{312BB3FC-6951-15EF-BC70-F2E8AF281C75}"/>
           </ac:spMkLst>
         </pc:spChg>
+        <pc:spChg chg="add">
+          <ac:chgData name="Pablo Tejero Sanz" userId="9498043962a09e1f" providerId="LiveId" clId="{180266BD-9C8F-4BC4-AEA3-CCB7C1E90ED0}" dt="2024-02-05T15:57:31.862" v="1946" actId="26606"/>
+          <ac:spMkLst>
+            <pc:docMk/>
+            <pc:sldMk cId="1425708407" sldId="256"/>
+            <ac:spMk id="8" creationId="{7D9D36D6-2AC5-46A1-A849-4C82D5264A3A}"/>
+          </ac:spMkLst>
+        </pc:spChg>
+        <pc:picChg chg="add">
+          <ac:chgData name="Pablo Tejero Sanz" userId="9498043962a09e1f" providerId="LiveId" clId="{180266BD-9C8F-4BC4-AEA3-CCB7C1E90ED0}" dt="2024-02-05T15:57:31.862" v="1946" actId="26606"/>
+          <ac:picMkLst>
+            <pc:docMk/>
+            <pc:sldMk cId="1425708407" sldId="256"/>
+            <ac:picMk id="4" creationId="{74A4A33E-77CD-E7DA-E8A3-9BB4BEEA411D}"/>
+          </ac:picMkLst>
+        </pc:picChg>
       </pc:sldChg>
       <pc:sldChg chg="addSp modSp new mod">
         <pc:chgData name="Pablo Tejero Sanz" userId="9498043962a09e1f" providerId="LiveId" clId="{180266BD-9C8F-4BC4-AEA3-CCB7C1E90ED0}" dt="2024-01-29T18:03:37.316" v="803" actId="255"/>
@@ -650,7 +666,7 @@
           <a:p>
             <a:fld id="{8A02DA10-492C-4E7F-8FEF-21524E44A6F9}" type="datetimeFigureOut">
               <a:rPr lang="es-ES" smtClean="0"/>
-              <a:t>31/01/2024</a:t>
+              <a:t>05/02/2024</a:t>
             </a:fld>
             <a:endParaRPr lang="es-ES"/>
           </a:p>
@@ -1222,7 +1238,7 @@
           <a:p>
             <a:fld id="{3B30799D-08C4-469E-966B-49D3B77473EF}" type="datetimeFigureOut">
               <a:rPr lang="es-ES" smtClean="0"/>
-              <a:t>31/01/2024</a:t>
+              <a:t>05/02/2024</a:t>
             </a:fld>
             <a:endParaRPr lang="es-ES"/>
           </a:p>
@@ -1422,7 +1438,7 @@
           <a:p>
             <a:fld id="{3B30799D-08C4-469E-966B-49D3B77473EF}" type="datetimeFigureOut">
               <a:rPr lang="es-ES" smtClean="0"/>
-              <a:t>31/01/2024</a:t>
+              <a:t>05/02/2024</a:t>
             </a:fld>
             <a:endParaRPr lang="es-ES"/>
           </a:p>
@@ -1632,7 +1648,7 @@
           <a:p>
             <a:fld id="{3B30799D-08C4-469E-966B-49D3B77473EF}" type="datetimeFigureOut">
               <a:rPr lang="es-ES" smtClean="0"/>
-              <a:t>31/01/2024</a:t>
+              <a:t>05/02/2024</a:t>
             </a:fld>
             <a:endParaRPr lang="es-ES"/>
           </a:p>
@@ -1832,7 +1848,7 @@
           <a:p>
             <a:fld id="{3B30799D-08C4-469E-966B-49D3B77473EF}" type="datetimeFigureOut">
               <a:rPr lang="es-ES" smtClean="0"/>
-              <a:t>31/01/2024</a:t>
+              <a:t>05/02/2024</a:t>
             </a:fld>
             <a:endParaRPr lang="es-ES"/>
           </a:p>
@@ -2108,7 +2124,7 @@
           <a:p>
             <a:fld id="{3B30799D-08C4-469E-966B-49D3B77473EF}" type="datetimeFigureOut">
               <a:rPr lang="es-ES" smtClean="0"/>
-              <a:t>31/01/2024</a:t>
+              <a:t>05/02/2024</a:t>
             </a:fld>
             <a:endParaRPr lang="es-ES"/>
           </a:p>
@@ -2376,7 +2392,7 @@
           <a:p>
             <a:fld id="{3B30799D-08C4-469E-966B-49D3B77473EF}" type="datetimeFigureOut">
               <a:rPr lang="es-ES" smtClean="0"/>
-              <a:t>31/01/2024</a:t>
+              <a:t>05/02/2024</a:t>
             </a:fld>
             <a:endParaRPr lang="es-ES"/>
           </a:p>
@@ -2791,7 +2807,7 @@
           <a:p>
             <a:fld id="{3B30799D-08C4-469E-966B-49D3B77473EF}" type="datetimeFigureOut">
               <a:rPr lang="es-ES" smtClean="0"/>
-              <a:t>31/01/2024</a:t>
+              <a:t>05/02/2024</a:t>
             </a:fld>
             <a:endParaRPr lang="es-ES"/>
           </a:p>
@@ -2933,7 +2949,7 @@
           <a:p>
             <a:fld id="{3B30799D-08C4-469E-966B-49D3B77473EF}" type="datetimeFigureOut">
               <a:rPr lang="es-ES" smtClean="0"/>
-              <a:t>31/01/2024</a:t>
+              <a:t>05/02/2024</a:t>
             </a:fld>
             <a:endParaRPr lang="es-ES"/>
           </a:p>
@@ -3046,7 +3062,7 @@
           <a:p>
             <a:fld id="{3B30799D-08C4-469E-966B-49D3B77473EF}" type="datetimeFigureOut">
               <a:rPr lang="es-ES" smtClean="0"/>
-              <a:t>31/01/2024</a:t>
+              <a:t>05/02/2024</a:t>
             </a:fld>
             <a:endParaRPr lang="es-ES"/>
           </a:p>
@@ -3359,7 +3375,7 @@
           <a:p>
             <a:fld id="{3B30799D-08C4-469E-966B-49D3B77473EF}" type="datetimeFigureOut">
               <a:rPr lang="es-ES" smtClean="0"/>
-              <a:t>31/01/2024</a:t>
+              <a:t>05/02/2024</a:t>
             </a:fld>
             <a:endParaRPr lang="es-ES"/>
           </a:p>
@@ -3648,7 +3664,7 @@
           <a:p>
             <a:fld id="{3B30799D-08C4-469E-966B-49D3B77473EF}" type="datetimeFigureOut">
               <a:rPr lang="es-ES" smtClean="0"/>
-              <a:t>31/01/2024</a:t>
+              <a:t>05/02/2024</a:t>
             </a:fld>
             <a:endParaRPr lang="es-ES"/>
           </a:p>
@@ -3891,7 +3907,7 @@
           <a:p>
             <a:fld id="{3B30799D-08C4-469E-966B-49D3B77473EF}" type="datetimeFigureOut">
               <a:rPr lang="es-ES" smtClean="0"/>
-              <a:t>31/01/2024</a:t>
+              <a:t>05/02/2024</a:t>
             </a:fld>
             <a:endParaRPr lang="es-ES"/>
           </a:p>
@@ -4294,6 +4310,14 @@
 <file path=ppt/slides/slide1.xml><?xml version="1.0" encoding="utf-8"?>
 <p:sld xmlns:a="http://schemas.openxmlformats.org/drawingml/2006/main" xmlns:r="http://schemas.openxmlformats.org/officeDocument/2006/relationships" xmlns:p="http://schemas.openxmlformats.org/presentationml/2006/main">
   <p:cSld>
+    <p:bg>
+      <p:bgPr>
+        <a:solidFill>
+          <a:schemeClr val="bg1"/>
+        </a:solidFill>
+        <a:effectLst/>
+      </p:bgPr>
+    </p:bg>
     <p:spTree>
       <p:nvGrpSpPr>
         <p:cNvPr id="1" name=""/>
@@ -4308,6 +4332,66 @@
           <a:chExt cx="0" cy="0"/>
         </a:xfrm>
       </p:grpSpPr>
+      <p:sp useBgFill="1">
+        <p:nvSpPr>
+          <p:cNvPr id="8" name="Rectangle 7">
+            <a:extLst>
+              <a:ext uri="{FF2B5EF4-FFF2-40B4-BE49-F238E27FC236}">
+                <a16:creationId xmlns:a16="http://schemas.microsoft.com/office/drawing/2014/main" id="{7D9D36D6-2AC5-46A1-A849-4C82D5264A3A}"/>
+              </a:ext>
+              <a:ext uri="{C183D7F6-B498-43B3-948B-1728B52AA6E4}">
+                <adec:decorative xmlns:adec="http://schemas.microsoft.com/office/drawing/2017/decorative" val="1"/>
+              </a:ext>
+            </a:extLst>
+          </p:cNvPr>
+          <p:cNvSpPr>
+            <a:spLocks noGrp="1" noRot="1" noChangeAspect="1" noMove="1" noResize="1" noEditPoints="1" noAdjustHandles="1" noChangeArrowheads="1" noChangeShapeType="1" noTextEdit="1"/>
+          </p:cNvSpPr>
+          <p:nvPr>
+            <p:extLst>
+              <p:ext uri="{386F3935-93C4-4BCD-93E2-E3B085C9AB24}">
+                <p16:designElem xmlns:p16="http://schemas.microsoft.com/office/powerpoint/2015/main" val="1"/>
+              </p:ext>
+            </p:extLst>
+          </p:nvPr>
+        </p:nvSpPr>
+        <p:spPr>
+          <a:xfrm>
+            <a:off x="-1" y="0"/>
+            <a:ext cx="12188952" cy="6858000"/>
+          </a:xfrm>
+          <a:prstGeom prst="rect">
+            <a:avLst/>
+          </a:prstGeom>
+          <a:ln>
+            <a:noFill/>
+          </a:ln>
+        </p:spPr>
+        <p:style>
+          <a:lnRef idx="2">
+            <a:schemeClr val="accent1">
+              <a:shade val="50000"/>
+            </a:schemeClr>
+          </a:lnRef>
+          <a:fillRef idx="1">
+            <a:schemeClr val="accent1"/>
+          </a:fillRef>
+          <a:effectRef idx="0">
+            <a:schemeClr val="accent1"/>
+          </a:effectRef>
+          <a:fontRef idx="minor">
+            <a:schemeClr val="lt1"/>
+          </a:fontRef>
+        </p:style>
+        <p:txBody>
+          <a:bodyPr rtlCol="0" anchor="ctr"/>
+          <a:lstStyle/>
+          <a:p>
+            <a:pPr algn="ctr"/>
+            <a:endParaRPr lang="en-US" dirty="0"/>
+          </a:p>
+        </p:txBody>
+      </p:sp>
       <p:sp>
         <p:nvSpPr>
           <p:cNvPr id="2" name="Title 1">
@@ -4324,18 +4408,56 @@
             <p:ph type="ctrTitle"/>
           </p:nvPr>
         </p:nvSpPr>
-        <p:spPr/>
-        <p:txBody>
-          <a:bodyPr/>
-          <a:lstStyle/>
-          <a:p>
-            <a:r>
-              <a:rPr lang="es-ES" dirty="0"/>
+        <p:spPr>
+          <a:xfrm>
+            <a:off x="5354955" y="552182"/>
+            <a:ext cx="5998840" cy="3343135"/>
+          </a:xfrm>
+          <a:noFill/>
+        </p:spPr>
+        <p:txBody>
+          <a:bodyPr>
+            <a:normAutofit/>
+          </a:bodyPr>
+          <a:lstStyle/>
+          <a:p>
+            <a:pPr algn="l"/>
+            <a:r>
+              <a:rPr lang="es-ES" sz="5200"/>
               <a:t>THRESHOLDING METHODS</a:t>
             </a:r>
           </a:p>
         </p:txBody>
       </p:sp>
+      <p:pic>
+        <p:nvPicPr>
+          <p:cNvPr id="4" name="Picture 3">
+            <a:extLst>
+              <a:ext uri="{FF2B5EF4-FFF2-40B4-BE49-F238E27FC236}">
+                <a16:creationId xmlns:a16="http://schemas.microsoft.com/office/drawing/2014/main" id="{74A4A33E-77CD-E7DA-E8A3-9BB4BEEA411D}"/>
+              </a:ext>
+            </a:extLst>
+          </p:cNvPr>
+          <p:cNvPicPr>
+            <a:picLocks noChangeAspect="1"/>
+          </p:cNvPicPr>
+          <p:nvPr/>
+        </p:nvPicPr>
+        <p:blipFill rotWithShape="1">
+          <a:blip r:embed="rId2"/>
+          <a:srcRect l="25257" r="23598" b="1"/>
+          <a:stretch/>
+        </p:blipFill>
+        <p:spPr>
+          <a:xfrm>
+            <a:off x="20" y="10"/>
+            <a:ext cx="4992985" cy="6857990"/>
+          </a:xfrm>
+          <a:prstGeom prst="rect">
+            <a:avLst/>
+          </a:prstGeom>
+        </p:spPr>
+      </p:pic>
     </p:spTree>
     <p:extLst>
       <p:ext uri="{BB962C8B-B14F-4D97-AF65-F5344CB8AC3E}">
@@ -4346,6 +4468,98 @@
   <p:clrMapOvr>
     <a:masterClrMapping/>
   </p:clrMapOvr>
+  <p:timing>
+    <p:tnLst>
+      <p:par>
+        <p:cTn id="1" dur="indefinite" restart="never" nodeType="tmRoot">
+          <p:childTnLst>
+            <p:seq concurrent="1" nextAc="seek">
+              <p:cTn id="2" dur="indefinite" nodeType="mainSeq">
+                <p:childTnLst>
+                  <p:par>
+                    <p:cTn id="3" fill="hold">
+                      <p:stCondLst>
+                        <p:cond delay="indefinite"/>
+                        <p:cond evt="onBegin" delay="0">
+                          <p:tn val="2"/>
+                        </p:cond>
+                      </p:stCondLst>
+                      <p:childTnLst>
+                        <p:par>
+                          <p:cTn id="4" fill="hold">
+                            <p:stCondLst>
+                              <p:cond delay="0"/>
+                            </p:stCondLst>
+                            <p:childTnLst>
+                              <p:par>
+                                <p:cTn id="5" presetID="10" presetClass="entr" presetSubtype="0" fill="hold" grpId="0" nodeType="withEffect">
+                                  <p:stCondLst>
+                                    <p:cond delay="1000"/>
+                                  </p:stCondLst>
+                                  <p:iterate type="lt">
+                                    <p:tmPct val="10000"/>
+                                  </p:iterate>
+                                  <p:childTnLst>
+                                    <p:set>
+                                      <p:cBhvr>
+                                        <p:cTn id="6" dur="1" fill="hold">
+                                          <p:stCondLst>
+                                            <p:cond delay="0"/>
+                                          </p:stCondLst>
+                                        </p:cTn>
+                                        <p:tgtEl>
+                                          <p:spTgt spid="2"/>
+                                        </p:tgtEl>
+                                        <p:attrNameLst>
+                                          <p:attrName>style.visibility</p:attrName>
+                                        </p:attrNameLst>
+                                      </p:cBhvr>
+                                      <p:to>
+                                        <p:strVal val="visible"/>
+                                      </p:to>
+                                    </p:set>
+                                    <p:animEffect transition="in" filter="fade">
+                                      <p:cBhvr>
+                                        <p:cTn id="7" dur="400"/>
+                                        <p:tgtEl>
+                                          <p:spTgt spid="2"/>
+                                        </p:tgtEl>
+                                      </p:cBhvr>
+                                    </p:animEffect>
+                                  </p:childTnLst>
+                                </p:cTn>
+                              </p:par>
+                            </p:childTnLst>
+                          </p:cTn>
+                        </p:par>
+                      </p:childTnLst>
+                    </p:cTn>
+                  </p:par>
+                </p:childTnLst>
+              </p:cTn>
+              <p:prevCondLst>
+                <p:cond evt="onPrev" delay="0">
+                  <p:tgtEl>
+                    <p:sldTgt/>
+                  </p:tgtEl>
+                </p:cond>
+              </p:prevCondLst>
+              <p:nextCondLst>
+                <p:cond evt="onNext" delay="0">
+                  <p:tgtEl>
+                    <p:sldTgt/>
+                  </p:tgtEl>
+                </p:cond>
+              </p:nextCondLst>
+            </p:seq>
+          </p:childTnLst>
+        </p:cTn>
+      </p:par>
+    </p:tnLst>
+    <p:bldLst>
+      <p:bldP spid="2" grpId="0"/>
+    </p:bldLst>
+  </p:timing>
 </p:sld>
 </file>
 

</xml_diff>